<commit_message>
add darkMode + prepa variabe quiz
</commit_message>
<xml_diff>
--- a/assets/visuels/conception-icone.pptx
+++ b/assets/visuels/conception-icone.pptx
@@ -23,6 +23,10 @@
     <p:sldId id="267" r:id="rId17"/>
     <p:sldId id="268" r:id="rId18"/>
     <p:sldId id="269" r:id="rId19"/>
+    <p:sldId id="274" r:id="rId20"/>
+    <p:sldId id="275" r:id="rId21"/>
+    <p:sldId id="276" r:id="rId22"/>
+    <p:sldId id="277" r:id="rId23"/>
   </p:sldIdLst>
   <p:sldSz cx="914400" cy="914400"/>
   <p:notesSz cx="6858000" cy="9144000"/>
@@ -121,6 +125,11 @@
       </a:defRPr>
     </a:lvl9pPr>
   </p:defaultTextStyle>
+  <p:extLst>
+    <p:ext uri="{EFAFB233-063F-42B5-8137-9DF3F51BA10A}">
+      <p15:sldGuideLst xmlns:p15="http://schemas.microsoft.com/office/powerpoint/2012/main"/>
+    </p:ext>
+  </p:extLst>
 </p:presentation>
 </file>
 
@@ -255,7 +264,7 @@
           <a:p>
             <a:fld id="{7D48E400-A6E5-4363-AC6E-241220507A14}" type="datetimeFigureOut">
               <a:rPr lang="fr-FR" smtClean="0"/>
-              <a:t>21/03/2025</a:t>
+              <a:t>26/03/2025</a:t>
             </a:fld>
             <a:endParaRPr lang="fr-FR"/>
           </a:p>
@@ -425,7 +434,7 @@
           <a:p>
             <a:fld id="{7D48E400-A6E5-4363-AC6E-241220507A14}" type="datetimeFigureOut">
               <a:rPr lang="fr-FR" smtClean="0"/>
-              <a:t>21/03/2025</a:t>
+              <a:t>26/03/2025</a:t>
             </a:fld>
             <a:endParaRPr lang="fr-FR"/>
           </a:p>
@@ -605,7 +614,7 @@
           <a:p>
             <a:fld id="{7D48E400-A6E5-4363-AC6E-241220507A14}" type="datetimeFigureOut">
               <a:rPr lang="fr-FR" smtClean="0"/>
-              <a:t>21/03/2025</a:t>
+              <a:t>26/03/2025</a:t>
             </a:fld>
             <a:endParaRPr lang="fr-FR"/>
           </a:p>
@@ -775,7 +784,7 @@
           <a:p>
             <a:fld id="{7D48E400-A6E5-4363-AC6E-241220507A14}" type="datetimeFigureOut">
               <a:rPr lang="fr-FR" smtClean="0"/>
-              <a:t>21/03/2025</a:t>
+              <a:t>26/03/2025</a:t>
             </a:fld>
             <a:endParaRPr lang="fr-FR"/>
           </a:p>
@@ -1019,7 +1028,7 @@
           <a:p>
             <a:fld id="{7D48E400-A6E5-4363-AC6E-241220507A14}" type="datetimeFigureOut">
               <a:rPr lang="fr-FR" smtClean="0"/>
-              <a:t>21/03/2025</a:t>
+              <a:t>26/03/2025</a:t>
             </a:fld>
             <a:endParaRPr lang="fr-FR"/>
           </a:p>
@@ -1251,7 +1260,7 @@
           <a:p>
             <a:fld id="{7D48E400-A6E5-4363-AC6E-241220507A14}" type="datetimeFigureOut">
               <a:rPr lang="fr-FR" smtClean="0"/>
-              <a:t>21/03/2025</a:t>
+              <a:t>26/03/2025</a:t>
             </a:fld>
             <a:endParaRPr lang="fr-FR"/>
           </a:p>
@@ -1618,7 +1627,7 @@
           <a:p>
             <a:fld id="{7D48E400-A6E5-4363-AC6E-241220507A14}" type="datetimeFigureOut">
               <a:rPr lang="fr-FR" smtClean="0"/>
-              <a:t>21/03/2025</a:t>
+              <a:t>26/03/2025</a:t>
             </a:fld>
             <a:endParaRPr lang="fr-FR"/>
           </a:p>
@@ -1736,7 +1745,7 @@
           <a:p>
             <a:fld id="{7D48E400-A6E5-4363-AC6E-241220507A14}" type="datetimeFigureOut">
               <a:rPr lang="fr-FR" smtClean="0"/>
-              <a:t>21/03/2025</a:t>
+              <a:t>26/03/2025</a:t>
             </a:fld>
             <a:endParaRPr lang="fr-FR"/>
           </a:p>
@@ -1831,7 +1840,7 @@
           <a:p>
             <a:fld id="{7D48E400-A6E5-4363-AC6E-241220507A14}" type="datetimeFigureOut">
               <a:rPr lang="fr-FR" smtClean="0"/>
-              <a:t>21/03/2025</a:t>
+              <a:t>26/03/2025</a:t>
             </a:fld>
             <a:endParaRPr lang="fr-FR"/>
           </a:p>
@@ -2108,7 +2117,7 @@
           <a:p>
             <a:fld id="{7D48E400-A6E5-4363-AC6E-241220507A14}" type="datetimeFigureOut">
               <a:rPr lang="fr-FR" smtClean="0"/>
-              <a:t>21/03/2025</a:t>
+              <a:t>26/03/2025</a:t>
             </a:fld>
             <a:endParaRPr lang="fr-FR"/>
           </a:p>
@@ -2365,7 +2374,7 @@
           <a:p>
             <a:fld id="{7D48E400-A6E5-4363-AC6E-241220507A14}" type="datetimeFigureOut">
               <a:rPr lang="fr-FR" smtClean="0"/>
-              <a:t>21/03/2025</a:t>
+              <a:t>26/03/2025</a:t>
             </a:fld>
             <a:endParaRPr lang="fr-FR"/>
           </a:p>
@@ -2578,7 +2587,7 @@
           <a:p>
             <a:fld id="{7D48E400-A6E5-4363-AC6E-241220507A14}" type="datetimeFigureOut">
               <a:rPr lang="fr-FR" smtClean="0"/>
-              <a:t>21/03/2025</a:t>
+              <a:t>26/03/2025</a:t>
             </a:fld>
             <a:endParaRPr lang="fr-FR"/>
           </a:p>
@@ -4310,6 +4319,159 @@
 </p:sld>
 </file>
 
+<file path=ppt/slides/slide19.xml><?xml version="1.0" encoding="utf-8"?>
+<p:sld xmlns:a="http://schemas.openxmlformats.org/drawingml/2006/main" xmlns:r="http://schemas.openxmlformats.org/officeDocument/2006/relationships" xmlns:p="http://schemas.openxmlformats.org/presentationml/2006/main">
+  <p:cSld>
+    <p:spTree>
+      <p:nvGrpSpPr>
+        <p:cNvPr id="1" name="">
+          <a:extLst>
+            <a:ext uri="{FF2B5EF4-FFF2-40B4-BE49-F238E27FC236}">
+              <a16:creationId xmlns:a16="http://schemas.microsoft.com/office/drawing/2014/main" id="{AE427150-6026-EA63-9E8E-B386B567102F}"/>
+            </a:ext>
+          </a:extLst>
+        </p:cNvPr>
+        <p:cNvGrpSpPr/>
+        <p:nvPr/>
+      </p:nvGrpSpPr>
+      <p:grpSpPr>
+        <a:xfrm>
+          <a:off x="0" y="0"/>
+          <a:ext cx="0" cy="0"/>
+          <a:chOff x="0" y="0"/>
+          <a:chExt cx="0" cy="0"/>
+        </a:xfrm>
+      </p:grpSpPr>
+      <p:sp>
+        <p:nvSpPr>
+          <p:cNvPr id="4" name="AutoShape 2" descr="html icon">
+            <a:extLst>
+              <a:ext uri="{FF2B5EF4-FFF2-40B4-BE49-F238E27FC236}">
+                <a16:creationId xmlns:a16="http://schemas.microsoft.com/office/drawing/2014/main" id="{FEDEB67D-AC25-D2DE-E826-B3437E7881BC}"/>
+              </a:ext>
+            </a:extLst>
+          </p:cNvPr>
+          <p:cNvSpPr>
+            <a:spLocks noChangeAspect="1" noChangeArrowheads="1"/>
+          </p:cNvSpPr>
+          <p:nvPr/>
+        </p:nvSpPr>
+        <p:spPr bwMode="auto">
+          <a:xfrm>
+            <a:off x="0" y="0"/>
+            <a:ext cx="914400" cy="914400"/>
+          </a:xfrm>
+          <a:prstGeom prst="rect">
+            <a:avLst/>
+          </a:prstGeom>
+          <a:noFill/>
+          <a:extLst>
+            <a:ext uri="{909E8E84-426E-40DD-AFC4-6F175D3DCCD1}">
+              <a14:hiddenFill xmlns:a14="http://schemas.microsoft.com/office/drawing/2010/main">
+                <a:solidFill>
+                  <a:srgbClr val="FFFFFF"/>
+                </a:solidFill>
+              </a14:hiddenFill>
+            </a:ext>
+          </a:extLst>
+        </p:spPr>
+        <p:txBody>
+          <a:bodyPr vert="horz" wrap="square" lIns="91440" tIns="45720" rIns="91440" bIns="45720" numCol="1" anchor="t" anchorCtr="0" compatLnSpc="1">
+            <a:prstTxWarp prst="textNoShape">
+              <a:avLst/>
+            </a:prstTxWarp>
+          </a:bodyPr>
+          <a:lstStyle/>
+          <a:p>
+            <a:endParaRPr lang="fr-FR"/>
+          </a:p>
+        </p:txBody>
+      </p:sp>
+      <p:pic>
+        <p:nvPicPr>
+          <p:cNvPr id="5" name="Image 4">
+            <a:extLst>
+              <a:ext uri="{FF2B5EF4-FFF2-40B4-BE49-F238E27FC236}">
+                <a16:creationId xmlns:a16="http://schemas.microsoft.com/office/drawing/2014/main" id="{7257D325-6EE0-07AB-1B08-AFFF58125889}"/>
+              </a:ext>
+            </a:extLst>
+          </p:cNvPr>
+          <p:cNvPicPr>
+            <a:picLocks noChangeAspect="1"/>
+          </p:cNvPicPr>
+          <p:nvPr/>
+        </p:nvPicPr>
+        <p:blipFill>
+          <a:blip r:embed="rId2">
+            <a:extLst>
+              <a:ext uri="{28A0092B-C50C-407E-A947-70E740481C1C}">
+                <a14:useLocalDpi xmlns:a14="http://schemas.microsoft.com/office/drawing/2010/main" val="0"/>
+              </a:ext>
+            </a:extLst>
+          </a:blip>
+          <a:stretch>
+            <a:fillRect/>
+          </a:stretch>
+        </p:blipFill>
+        <p:spPr>
+          <a:xfrm>
+            <a:off x="647714" y="584791"/>
+            <a:ext cx="249962" cy="313678"/>
+          </a:xfrm>
+          <a:prstGeom prst="rect">
+            <a:avLst/>
+          </a:prstGeom>
+        </p:spPr>
+      </p:pic>
+      <p:pic>
+        <p:nvPicPr>
+          <p:cNvPr id="2" name="Image 1">
+            <a:extLst>
+              <a:ext uri="{FF2B5EF4-FFF2-40B4-BE49-F238E27FC236}">
+                <a16:creationId xmlns:a16="http://schemas.microsoft.com/office/drawing/2014/main" id="{F7EA3E25-FF53-E59F-39F8-B86779EB46AC}"/>
+              </a:ext>
+            </a:extLst>
+          </p:cNvPr>
+          <p:cNvPicPr>
+            <a:picLocks noChangeAspect="1"/>
+          </p:cNvPicPr>
+          <p:nvPr/>
+        </p:nvPicPr>
+        <p:blipFill>
+          <a:blip r:embed="rId3">
+            <a:extLst>
+              <a:ext uri="{28A0092B-C50C-407E-A947-70E740481C1C}">
+                <a14:useLocalDpi xmlns:a14="http://schemas.microsoft.com/office/drawing/2010/main" val="0"/>
+              </a:ext>
+            </a:extLst>
+          </a:blip>
+          <a:stretch>
+            <a:fillRect/>
+          </a:stretch>
+        </p:blipFill>
+        <p:spPr>
+          <a:xfrm>
+            <a:off x="28253" y="148975"/>
+            <a:ext cx="857893" cy="765425"/>
+          </a:xfrm>
+          <a:prstGeom prst="rect">
+            <a:avLst/>
+          </a:prstGeom>
+        </p:spPr>
+      </p:pic>
+    </p:spTree>
+    <p:extLst>
+      <p:ext uri="{BB962C8B-B14F-4D97-AF65-F5344CB8AC3E}">
+        <p14:creationId xmlns:p14="http://schemas.microsoft.com/office/powerpoint/2010/main" val="3052283972"/>
+      </p:ext>
+    </p:extLst>
+  </p:cSld>
+  <p:clrMapOvr>
+    <a:masterClrMapping/>
+  </p:clrMapOvr>
+</p:sld>
+</file>
+
 <file path=ppt/slides/slide2.xml><?xml version="1.0" encoding="utf-8"?>
 <p:sld xmlns:a="http://schemas.openxmlformats.org/drawingml/2006/main" xmlns:r="http://schemas.openxmlformats.org/officeDocument/2006/relationships" xmlns:p="http://schemas.openxmlformats.org/presentationml/2006/main">
   <p:cSld>
@@ -4418,6 +4580,393 @@
     <p:extLst>
       <p:ext uri="{BB962C8B-B14F-4D97-AF65-F5344CB8AC3E}">
         <p14:creationId xmlns:p14="http://schemas.microsoft.com/office/powerpoint/2010/main" val="1560649942"/>
+      </p:ext>
+    </p:extLst>
+  </p:cSld>
+  <p:clrMapOvr>
+    <a:masterClrMapping/>
+  </p:clrMapOvr>
+</p:sld>
+</file>
+
+<file path=ppt/slides/slide20.xml><?xml version="1.0" encoding="utf-8"?>
+<p:sld xmlns:a="http://schemas.openxmlformats.org/drawingml/2006/main" xmlns:r="http://schemas.openxmlformats.org/officeDocument/2006/relationships" xmlns:p="http://schemas.openxmlformats.org/presentationml/2006/main">
+  <p:cSld>
+    <p:spTree>
+      <p:nvGrpSpPr>
+        <p:cNvPr id="1" name="">
+          <a:extLst>
+            <a:ext uri="{FF2B5EF4-FFF2-40B4-BE49-F238E27FC236}">
+              <a16:creationId xmlns:a16="http://schemas.microsoft.com/office/drawing/2014/main" id="{68D33A83-8B98-52AB-C788-69228F534DBB}"/>
+            </a:ext>
+          </a:extLst>
+        </p:cNvPr>
+        <p:cNvGrpSpPr/>
+        <p:nvPr/>
+      </p:nvGrpSpPr>
+      <p:grpSpPr>
+        <a:xfrm>
+          <a:off x="0" y="0"/>
+          <a:ext cx="0" cy="0"/>
+          <a:chOff x="0" y="0"/>
+          <a:chExt cx="0" cy="0"/>
+        </a:xfrm>
+      </p:grpSpPr>
+      <p:sp>
+        <p:nvSpPr>
+          <p:cNvPr id="4" name="AutoShape 2" descr="html icon">
+            <a:extLst>
+              <a:ext uri="{FF2B5EF4-FFF2-40B4-BE49-F238E27FC236}">
+                <a16:creationId xmlns:a16="http://schemas.microsoft.com/office/drawing/2014/main" id="{22275DFE-90AA-4F35-23E7-FE4BAE90F4D6}"/>
+              </a:ext>
+            </a:extLst>
+          </p:cNvPr>
+          <p:cNvSpPr>
+            <a:spLocks noChangeAspect="1" noChangeArrowheads="1"/>
+          </p:cNvSpPr>
+          <p:nvPr/>
+        </p:nvSpPr>
+        <p:spPr bwMode="auto">
+          <a:xfrm>
+            <a:off x="0" y="0"/>
+            <a:ext cx="914400" cy="914400"/>
+          </a:xfrm>
+          <a:prstGeom prst="rect">
+            <a:avLst/>
+          </a:prstGeom>
+          <a:noFill/>
+          <a:extLst>
+            <a:ext uri="{909E8E84-426E-40DD-AFC4-6F175D3DCCD1}">
+              <a14:hiddenFill xmlns:a14="http://schemas.microsoft.com/office/drawing/2010/main">
+                <a:solidFill>
+                  <a:srgbClr val="FFFFFF"/>
+                </a:solidFill>
+              </a14:hiddenFill>
+            </a:ext>
+          </a:extLst>
+        </p:spPr>
+        <p:txBody>
+          <a:bodyPr vert="horz" wrap="square" lIns="91440" tIns="45720" rIns="91440" bIns="45720" numCol="1" anchor="t" anchorCtr="0" compatLnSpc="1">
+            <a:prstTxWarp prst="textNoShape">
+              <a:avLst/>
+            </a:prstTxWarp>
+          </a:bodyPr>
+          <a:lstStyle/>
+          <a:p>
+            <a:endParaRPr lang="fr-FR"/>
+          </a:p>
+        </p:txBody>
+      </p:sp>
+      <p:pic>
+        <p:nvPicPr>
+          <p:cNvPr id="9" name="Image 8">
+            <a:extLst>
+              <a:ext uri="{FF2B5EF4-FFF2-40B4-BE49-F238E27FC236}">
+                <a16:creationId xmlns:a16="http://schemas.microsoft.com/office/drawing/2014/main" id="{10554449-7F78-F758-69D8-3822328E7E7D}"/>
+              </a:ext>
+            </a:extLst>
+          </p:cNvPr>
+          <p:cNvPicPr>
+            <a:picLocks noChangeAspect="1"/>
+          </p:cNvPicPr>
+          <p:nvPr/>
+        </p:nvPicPr>
+        <p:blipFill>
+          <a:blip r:embed="rId2">
+            <a:extLst>
+              <a:ext uri="{28A0092B-C50C-407E-A947-70E740481C1C}">
+                <a14:useLocalDpi xmlns:a14="http://schemas.microsoft.com/office/drawing/2010/main" val="0"/>
+              </a:ext>
+            </a:extLst>
+          </a:blip>
+          <a:stretch>
+            <a:fillRect/>
+          </a:stretch>
+        </p:blipFill>
+        <p:spPr>
+          <a:xfrm>
+            <a:off x="28253" y="148975"/>
+            <a:ext cx="857893" cy="765425"/>
+          </a:xfrm>
+          <a:prstGeom prst="rect">
+            <a:avLst/>
+          </a:prstGeom>
+        </p:spPr>
+      </p:pic>
+    </p:spTree>
+    <p:extLst>
+      <p:ext uri="{BB962C8B-B14F-4D97-AF65-F5344CB8AC3E}">
+        <p14:creationId xmlns:p14="http://schemas.microsoft.com/office/powerpoint/2010/main" val="2552542914"/>
+      </p:ext>
+    </p:extLst>
+  </p:cSld>
+  <p:clrMapOvr>
+    <a:masterClrMapping/>
+  </p:clrMapOvr>
+</p:sld>
+</file>
+
+<file path=ppt/slides/slide21.xml><?xml version="1.0" encoding="utf-8"?>
+<p:sld xmlns:a="http://schemas.openxmlformats.org/drawingml/2006/main" xmlns:r="http://schemas.openxmlformats.org/officeDocument/2006/relationships" xmlns:p="http://schemas.openxmlformats.org/presentationml/2006/main">
+  <p:cSld>
+    <p:spTree>
+      <p:nvGrpSpPr>
+        <p:cNvPr id="1" name="">
+          <a:extLst>
+            <a:ext uri="{FF2B5EF4-FFF2-40B4-BE49-F238E27FC236}">
+              <a16:creationId xmlns:a16="http://schemas.microsoft.com/office/drawing/2014/main" id="{A5F18E36-BCF7-44E7-A295-41231F89B822}"/>
+            </a:ext>
+          </a:extLst>
+        </p:cNvPr>
+        <p:cNvGrpSpPr/>
+        <p:nvPr/>
+      </p:nvGrpSpPr>
+      <p:grpSpPr>
+        <a:xfrm>
+          <a:off x="0" y="0"/>
+          <a:ext cx="0" cy="0"/>
+          <a:chOff x="0" y="0"/>
+          <a:chExt cx="0" cy="0"/>
+        </a:xfrm>
+      </p:grpSpPr>
+      <p:pic>
+        <p:nvPicPr>
+          <p:cNvPr id="3" name="Image 2">
+            <a:extLst>
+              <a:ext uri="{FF2B5EF4-FFF2-40B4-BE49-F238E27FC236}">
+                <a16:creationId xmlns:a16="http://schemas.microsoft.com/office/drawing/2014/main" id="{9D1377EE-92E3-E3AA-9A80-304BF3A32140}"/>
+              </a:ext>
+            </a:extLst>
+          </p:cNvPr>
+          <p:cNvPicPr>
+            <a:picLocks noChangeAspect="1"/>
+          </p:cNvPicPr>
+          <p:nvPr/>
+        </p:nvPicPr>
+        <p:blipFill>
+          <a:blip r:embed="rId2">
+            <a:extLst>
+              <a:ext uri="{28A0092B-C50C-407E-A947-70E740481C1C}">
+                <a14:useLocalDpi xmlns:a14="http://schemas.microsoft.com/office/drawing/2010/main" val="0"/>
+              </a:ext>
+            </a:extLst>
+          </a:blip>
+          <a:stretch>
+            <a:fillRect/>
+          </a:stretch>
+        </p:blipFill>
+        <p:spPr>
+          <a:xfrm>
+            <a:off x="0" y="0"/>
+            <a:ext cx="914400" cy="914400"/>
+          </a:xfrm>
+          <a:prstGeom prst="rect">
+            <a:avLst/>
+          </a:prstGeom>
+        </p:spPr>
+      </p:pic>
+      <p:sp>
+        <p:nvSpPr>
+          <p:cNvPr id="4" name="AutoShape 2" descr="html icon">
+            <a:extLst>
+              <a:ext uri="{FF2B5EF4-FFF2-40B4-BE49-F238E27FC236}">
+                <a16:creationId xmlns:a16="http://schemas.microsoft.com/office/drawing/2014/main" id="{24683D98-F50C-CF36-9EDE-A3CC67ECDB22}"/>
+              </a:ext>
+            </a:extLst>
+          </p:cNvPr>
+          <p:cNvSpPr>
+            <a:spLocks noChangeAspect="1" noChangeArrowheads="1"/>
+          </p:cNvSpPr>
+          <p:nvPr/>
+        </p:nvSpPr>
+        <p:spPr bwMode="auto">
+          <a:xfrm>
+            <a:off x="0" y="0"/>
+            <a:ext cx="914400" cy="914400"/>
+          </a:xfrm>
+          <a:prstGeom prst="rect">
+            <a:avLst/>
+          </a:prstGeom>
+          <a:noFill/>
+          <a:extLst>
+            <a:ext uri="{909E8E84-426E-40DD-AFC4-6F175D3DCCD1}">
+              <a14:hiddenFill xmlns:a14="http://schemas.microsoft.com/office/drawing/2010/main">
+                <a:solidFill>
+                  <a:srgbClr val="FFFFFF"/>
+                </a:solidFill>
+              </a14:hiddenFill>
+            </a:ext>
+          </a:extLst>
+        </p:spPr>
+        <p:txBody>
+          <a:bodyPr vert="horz" wrap="square" lIns="91440" tIns="45720" rIns="91440" bIns="45720" numCol="1" anchor="t" anchorCtr="0" compatLnSpc="1">
+            <a:prstTxWarp prst="textNoShape">
+              <a:avLst/>
+            </a:prstTxWarp>
+          </a:bodyPr>
+          <a:lstStyle/>
+          <a:p>
+            <a:endParaRPr lang="fr-FR"/>
+          </a:p>
+        </p:txBody>
+      </p:sp>
+      <p:pic>
+        <p:nvPicPr>
+          <p:cNvPr id="5" name="Image 4">
+            <a:extLst>
+              <a:ext uri="{FF2B5EF4-FFF2-40B4-BE49-F238E27FC236}">
+                <a16:creationId xmlns:a16="http://schemas.microsoft.com/office/drawing/2014/main" id="{5FF7E9AE-3011-F656-735B-604C9A18680B}"/>
+              </a:ext>
+            </a:extLst>
+          </p:cNvPr>
+          <p:cNvPicPr>
+            <a:picLocks noChangeAspect="1"/>
+          </p:cNvPicPr>
+          <p:nvPr/>
+        </p:nvPicPr>
+        <p:blipFill>
+          <a:blip r:embed="rId3">
+            <a:extLst>
+              <a:ext uri="{28A0092B-C50C-407E-A947-70E740481C1C}">
+                <a14:useLocalDpi xmlns:a14="http://schemas.microsoft.com/office/drawing/2010/main" val="0"/>
+              </a:ext>
+            </a:extLst>
+          </a:blip>
+          <a:stretch>
+            <a:fillRect/>
+          </a:stretch>
+        </p:blipFill>
+        <p:spPr>
+          <a:xfrm>
+            <a:off x="647714" y="584791"/>
+            <a:ext cx="249962" cy="313678"/>
+          </a:xfrm>
+          <a:prstGeom prst="rect">
+            <a:avLst/>
+          </a:prstGeom>
+        </p:spPr>
+      </p:pic>
+    </p:spTree>
+    <p:extLst>
+      <p:ext uri="{BB962C8B-B14F-4D97-AF65-F5344CB8AC3E}">
+        <p14:creationId xmlns:p14="http://schemas.microsoft.com/office/powerpoint/2010/main" val="3831622012"/>
+      </p:ext>
+    </p:extLst>
+  </p:cSld>
+  <p:clrMapOvr>
+    <a:masterClrMapping/>
+  </p:clrMapOvr>
+</p:sld>
+</file>
+
+<file path=ppt/slides/slide22.xml><?xml version="1.0" encoding="utf-8"?>
+<p:sld xmlns:a="http://schemas.openxmlformats.org/drawingml/2006/main" xmlns:r="http://schemas.openxmlformats.org/officeDocument/2006/relationships" xmlns:p="http://schemas.openxmlformats.org/presentationml/2006/main">
+  <p:cSld>
+    <p:spTree>
+      <p:nvGrpSpPr>
+        <p:cNvPr id="1" name="">
+          <a:extLst>
+            <a:ext uri="{FF2B5EF4-FFF2-40B4-BE49-F238E27FC236}">
+              <a16:creationId xmlns:a16="http://schemas.microsoft.com/office/drawing/2014/main" id="{AE5AB3D2-E0AE-CF31-AA15-F1DF1F5E9D2B}"/>
+            </a:ext>
+          </a:extLst>
+        </p:cNvPr>
+        <p:cNvGrpSpPr/>
+        <p:nvPr/>
+      </p:nvGrpSpPr>
+      <p:grpSpPr>
+        <a:xfrm>
+          <a:off x="0" y="0"/>
+          <a:ext cx="0" cy="0"/>
+          <a:chOff x="0" y="0"/>
+          <a:chExt cx="0" cy="0"/>
+        </a:xfrm>
+      </p:grpSpPr>
+      <p:sp>
+        <p:nvSpPr>
+          <p:cNvPr id="4" name="AutoShape 2" descr="html icon">
+            <a:extLst>
+              <a:ext uri="{FF2B5EF4-FFF2-40B4-BE49-F238E27FC236}">
+                <a16:creationId xmlns:a16="http://schemas.microsoft.com/office/drawing/2014/main" id="{AD0AA250-E2AA-1DBF-0F96-F2B0EA938E48}"/>
+              </a:ext>
+            </a:extLst>
+          </p:cNvPr>
+          <p:cNvSpPr>
+            <a:spLocks noChangeAspect="1" noChangeArrowheads="1"/>
+          </p:cNvSpPr>
+          <p:nvPr/>
+        </p:nvSpPr>
+        <p:spPr bwMode="auto">
+          <a:xfrm>
+            <a:off x="0" y="0"/>
+            <a:ext cx="914400" cy="914400"/>
+          </a:xfrm>
+          <a:prstGeom prst="rect">
+            <a:avLst/>
+          </a:prstGeom>
+          <a:noFill/>
+          <a:extLst>
+            <a:ext uri="{909E8E84-426E-40DD-AFC4-6F175D3DCCD1}">
+              <a14:hiddenFill xmlns:a14="http://schemas.microsoft.com/office/drawing/2010/main">
+                <a:solidFill>
+                  <a:srgbClr val="FFFFFF"/>
+                </a:solidFill>
+              </a14:hiddenFill>
+            </a:ext>
+          </a:extLst>
+        </p:spPr>
+        <p:txBody>
+          <a:bodyPr vert="horz" wrap="square" lIns="91440" tIns="45720" rIns="91440" bIns="45720" numCol="1" anchor="t" anchorCtr="0" compatLnSpc="1">
+            <a:prstTxWarp prst="textNoShape">
+              <a:avLst/>
+            </a:prstTxWarp>
+          </a:bodyPr>
+          <a:lstStyle/>
+          <a:p>
+            <a:endParaRPr lang="fr-FR"/>
+          </a:p>
+        </p:txBody>
+      </p:sp>
+      <p:pic>
+        <p:nvPicPr>
+          <p:cNvPr id="7" name="Image 6">
+            <a:extLst>
+              <a:ext uri="{FF2B5EF4-FFF2-40B4-BE49-F238E27FC236}">
+                <a16:creationId xmlns:a16="http://schemas.microsoft.com/office/drawing/2014/main" id="{35F8DB77-1014-FC61-D0DA-E6193B24E787}"/>
+              </a:ext>
+            </a:extLst>
+          </p:cNvPr>
+          <p:cNvPicPr>
+            <a:picLocks noChangeAspect="1"/>
+          </p:cNvPicPr>
+          <p:nvPr/>
+        </p:nvPicPr>
+        <p:blipFill>
+          <a:blip r:embed="rId2">
+            <a:extLst>
+              <a:ext uri="{28A0092B-C50C-407E-A947-70E740481C1C}">
+                <a14:useLocalDpi xmlns:a14="http://schemas.microsoft.com/office/drawing/2010/main" val="0"/>
+              </a:ext>
+            </a:extLst>
+          </a:blip>
+          <a:stretch>
+            <a:fillRect/>
+          </a:stretch>
+        </p:blipFill>
+        <p:spPr>
+          <a:xfrm>
+            <a:off x="0" y="0"/>
+            <a:ext cx="914400" cy="914400"/>
+          </a:xfrm>
+          <a:prstGeom prst="rect">
+            <a:avLst/>
+          </a:prstGeom>
+        </p:spPr>
+      </p:pic>
+    </p:spTree>
+    <p:extLst>
+      <p:ext uri="{BB962C8B-B14F-4D97-AF65-F5344CB8AC3E}">
+        <p14:creationId xmlns:p14="http://schemas.microsoft.com/office/powerpoint/2010/main" val="1449657958"/>
       </p:ext>
     </p:extLst>
   </p:cSld>

</xml_diff>